<commit_message>
Improve local DS diagram.
</commit_message>
<xml_diff>
--- a/DynamicForms/docs/images/Pictures for dynamic forms doc.pptx
+++ b/DynamicForms/docs/images/Pictures for dynamic forms doc.pptx
@@ -108,6 +108,11 @@
       </a:defRPr>
     </a:lvl9pPr>
   </p:defaultTextStyle>
+  <p:extLst>
+    <p:ext uri="{EFAFB233-063F-42B5-8137-9DF3F51BA10A}">
+      <p15:sldGuideLst xmlns:p15="http://schemas.microsoft.com/office/powerpoint/2012/main"/>
+    </p:ext>
+  </p:extLst>
 </p:presentation>
 </file>
 
@@ -5088,8 +5093,8 @@
         </p:nvSpPr>
         <p:spPr>
           <a:xfrm>
-            <a:off x="4821994" y="4479351"/>
-            <a:ext cx="2687594" cy="237700"/>
+            <a:off x="4558257" y="4532917"/>
+            <a:ext cx="3039970" cy="184133"/>
           </a:xfrm>
           <a:prstGeom prst="leftArrow">
             <a:avLst/>
@@ -5140,8 +5145,8 @@
         </p:nvSpPr>
         <p:spPr>
           <a:xfrm rot="10800000">
-            <a:off x="4821995" y="3780480"/>
-            <a:ext cx="2687592" cy="237699"/>
+            <a:off x="4558258" y="3834044"/>
+            <a:ext cx="3039969" cy="184132"/>
           </a:xfrm>
           <a:prstGeom prst="leftArrow">
             <a:avLst/>
@@ -5192,8 +5197,8 @@
         </p:nvSpPr>
         <p:spPr>
           <a:xfrm>
-            <a:off x="5699328" y="3411149"/>
-            <a:ext cx="665567" cy="369332"/>
+            <a:off x="5340189" y="3404489"/>
+            <a:ext cx="1476110" cy="369332"/>
           </a:xfrm>
           <a:prstGeom prst="rect">
             <a:avLst/>
@@ -5208,7 +5213,7 @@
           <a:p>
             <a:r>
               <a:rPr lang="en-US" dirty="0"/>
-              <a:t>JSON</a:t>
+              <a:t>JavaScript call</a:t>
             </a:r>
           </a:p>
         </p:txBody>
@@ -5227,8 +5232,8 @@
         </p:nvSpPr>
         <p:spPr>
           <a:xfrm>
-            <a:off x="5719672" y="4219423"/>
-            <a:ext cx="665567" cy="369332"/>
+            <a:off x="5724635" y="4742087"/>
+            <a:ext cx="558166" cy="307777"/>
           </a:xfrm>
           <a:prstGeom prst="rect">
             <a:avLst/>
@@ -5242,7 +5247,7 @@
           <a:lstStyle/>
           <a:p>
             <a:r>
-              <a:rPr lang="en-US" dirty="0"/>
+              <a:rPr lang="en-US" sz="1400" dirty="0"/>
               <a:t>JSON</a:t>
             </a:r>
           </a:p>
@@ -5349,6 +5354,41 @@
             <a:r>
               <a:rPr lang="en-US" dirty="0"/>
               <a:t>Some UI …</a:t>
+            </a:r>
+          </a:p>
+        </p:txBody>
+      </p:sp>
+      <p:sp>
+        <p:nvSpPr>
+          <p:cNvPr id="25" name="TextBox 24">
+            <a:extLst>
+              <a:ext uri="{FF2B5EF4-FFF2-40B4-BE49-F238E27FC236}">
+                <a16:creationId xmlns:a16="http://schemas.microsoft.com/office/drawing/2014/main" id="{3B479AD6-7A5D-4DA0-8CE8-37A6075090CD}"/>
+              </a:ext>
+            </a:extLst>
+          </p:cNvPr>
+          <p:cNvSpPr txBox="1"/>
+          <p:nvPr/>
+        </p:nvSpPr>
+        <p:spPr>
+          <a:xfrm>
+            <a:off x="5722609" y="3990239"/>
+            <a:ext cx="558166" cy="307777"/>
+          </a:xfrm>
+          <a:prstGeom prst="rect">
+            <a:avLst/>
+          </a:prstGeom>
+          <a:noFill/>
+        </p:spPr>
+        <p:txBody>
+          <a:bodyPr wrap="none" rtlCol="0">
+            <a:spAutoFit/>
+          </a:bodyPr>
+          <a:lstStyle/>
+          <a:p>
+            <a:r>
+              <a:rPr lang="en-US" sz="1400" dirty="0"/>
+              <a:t>JSON</a:t>
             </a:r>
           </a:p>
         </p:txBody>

</xml_diff>